<commit_message>
Change second prompt for generation in two steps. Fix classic templates.
</commit_message>
<xml_diff>
--- a/make_presentation/templates/templates/classic/_10.pptx
+++ b/make_presentation/templates/templates/classic/_10.pptx
@@ -301,7 +301,7 @@
             <a:pPr algn="r">
               <a:buNone/>
             </a:pPr>
-            <a:fld id="{2637668E-3712-4493-8E2E-6B961E0542E1}" type="slidenum">
+            <a:fld id="{53E23657-B8C9-4C8F-8263-66AAA7FDA109}" type="slidenum">
               <a:rPr b="0" lang="en-US" sz="1400" spc="-1" strike="noStrike">
                 <a:latin typeface="Times New Roman"/>
               </a:rPr>
@@ -349,7 +349,7 @@
         <p:spPr>
           <a:xfrm>
             <a:off x="380880" y="685800"/>
-            <a:ext cx="6093000" cy="3426120"/>
+            <a:ext cx="6092640" cy="3425760"/>
           </a:xfrm>
           <a:prstGeom prst="rect">
             <a:avLst/>
@@ -372,7 +372,7 @@
         <p:spPr>
           <a:xfrm>
             <a:off x="685800" y="4343400"/>
-            <a:ext cx="5483520" cy="4111920"/>
+            <a:ext cx="5483160" cy="4111560"/>
           </a:xfrm>
           <a:prstGeom prst="rect">
             <a:avLst/>
@@ -406,7 +406,7 @@
         <p:spPr>
           <a:xfrm>
             <a:off x="3884760" y="8685360"/>
-            <a:ext cx="2968920" cy="454320"/>
+            <a:ext cx="2968560" cy="453960"/>
           </a:xfrm>
           <a:prstGeom prst="rect">
             <a:avLst/>
@@ -442,7 +442,7 @@
               </a:lnSpc>
               <a:buNone/>
             </a:pPr>
-            <a:fld id="{D47FFC19-B788-4FB3-95CE-A28943971C9D}" type="slidenum">
+            <a:fld id="{BFE5E9B5-58CD-44B2-A63A-E1DAEB420B17}" type="slidenum">
               <a:rPr b="0" lang="en-US" sz="1200" spc="-1" strike="noStrike">
                 <a:solidFill>
                   <a:srgbClr val="000000"/>
@@ -493,7 +493,7 @@
         <p:spPr>
           <a:xfrm>
             <a:off x="380880" y="685800"/>
-            <a:ext cx="6093000" cy="3426120"/>
+            <a:ext cx="6092640" cy="3425760"/>
           </a:xfrm>
           <a:prstGeom prst="rect">
             <a:avLst/>
@@ -516,7 +516,7 @@
         <p:spPr>
           <a:xfrm>
             <a:off x="685800" y="4343400"/>
-            <a:ext cx="5483520" cy="4111920"/>
+            <a:ext cx="5483160" cy="4111560"/>
           </a:xfrm>
           <a:prstGeom prst="rect">
             <a:avLst/>
@@ -550,7 +550,7 @@
         <p:spPr>
           <a:xfrm>
             <a:off x="3884760" y="8685360"/>
-            <a:ext cx="2968920" cy="454320"/>
+            <a:ext cx="2968560" cy="453960"/>
           </a:xfrm>
           <a:prstGeom prst="rect">
             <a:avLst/>
@@ -586,7 +586,7 @@
               </a:lnSpc>
               <a:buNone/>
             </a:pPr>
-            <a:fld id="{E15E242F-BE82-4A99-9E6E-86F9D63F61FE}" type="slidenum">
+            <a:fld id="{D86DFB61-7E60-4993-B4A6-180FAA76E3A0}" type="slidenum">
               <a:rPr b="0" lang="en-US" sz="1200" spc="-1" strike="noStrike">
                 <a:solidFill>
                   <a:srgbClr val="000000"/>
@@ -637,7 +637,7 @@
         <p:spPr>
           <a:xfrm>
             <a:off x="380880" y="685800"/>
-            <a:ext cx="6093000" cy="3426120"/>
+            <a:ext cx="6092640" cy="3425760"/>
           </a:xfrm>
           <a:prstGeom prst="rect">
             <a:avLst/>
@@ -660,7 +660,7 @@
         <p:spPr>
           <a:xfrm>
             <a:off x="685800" y="4343400"/>
-            <a:ext cx="5483520" cy="4111920"/>
+            <a:ext cx="5483160" cy="4111560"/>
           </a:xfrm>
           <a:prstGeom prst="rect">
             <a:avLst/>
@@ -694,7 +694,7 @@
         <p:spPr>
           <a:xfrm>
             <a:off x="3884760" y="8685360"/>
-            <a:ext cx="2968920" cy="454320"/>
+            <a:ext cx="2968560" cy="453960"/>
           </a:xfrm>
           <a:prstGeom prst="rect">
             <a:avLst/>
@@ -730,7 +730,7 @@
               </a:lnSpc>
               <a:buNone/>
             </a:pPr>
-            <a:fld id="{3F13791A-68AC-4721-8580-1AAE0F33DBD6}" type="slidenum">
+            <a:fld id="{91B23065-7533-47AB-90AB-8E22BFE32DE7}" type="slidenum">
               <a:rPr b="0" lang="en-US" sz="1200" spc="-1" strike="noStrike">
                 <a:solidFill>
                   <a:srgbClr val="000000"/>
@@ -781,7 +781,7 @@
         <p:spPr>
           <a:xfrm>
             <a:off x="380880" y="685800"/>
-            <a:ext cx="6093000" cy="3426120"/>
+            <a:ext cx="6092640" cy="3425760"/>
           </a:xfrm>
           <a:prstGeom prst="rect">
             <a:avLst/>
@@ -804,7 +804,7 @@
         <p:spPr>
           <a:xfrm>
             <a:off x="685800" y="4343400"/>
-            <a:ext cx="5483520" cy="4111920"/>
+            <a:ext cx="5483160" cy="4111560"/>
           </a:xfrm>
           <a:prstGeom prst="rect">
             <a:avLst/>
@@ -838,7 +838,7 @@
         <p:spPr>
           <a:xfrm>
             <a:off x="3884760" y="8685360"/>
-            <a:ext cx="2968920" cy="454320"/>
+            <a:ext cx="2968560" cy="453960"/>
           </a:xfrm>
           <a:prstGeom prst="rect">
             <a:avLst/>
@@ -874,7 +874,7 @@
               </a:lnSpc>
               <a:buNone/>
             </a:pPr>
-            <a:fld id="{963A5ED1-F876-4448-BE04-13CE383CF3A4}" type="slidenum">
+            <a:fld id="{09AE99BF-C0DE-40A5-97B2-24954C3AAC22}" type="slidenum">
               <a:rPr b="0" lang="en-US" sz="1200" spc="-1" strike="noStrike">
                 <a:solidFill>
                   <a:srgbClr val="000000"/>
@@ -925,7 +925,7 @@
         <p:spPr>
           <a:xfrm>
             <a:off x="380880" y="685800"/>
-            <a:ext cx="6093000" cy="3426120"/>
+            <a:ext cx="6092640" cy="3425760"/>
           </a:xfrm>
           <a:prstGeom prst="rect">
             <a:avLst/>
@@ -948,7 +948,7 @@
         <p:spPr>
           <a:xfrm>
             <a:off x="685800" y="4343400"/>
-            <a:ext cx="5483520" cy="4111920"/>
+            <a:ext cx="5483160" cy="4111560"/>
           </a:xfrm>
           <a:prstGeom prst="rect">
             <a:avLst/>
@@ -982,7 +982,7 @@
         <p:spPr>
           <a:xfrm>
             <a:off x="3884760" y="8685360"/>
-            <a:ext cx="2968920" cy="454320"/>
+            <a:ext cx="2968560" cy="453960"/>
           </a:xfrm>
           <a:prstGeom prst="rect">
             <a:avLst/>
@@ -1018,7 +1018,7 @@
               </a:lnSpc>
               <a:buNone/>
             </a:pPr>
-            <a:fld id="{14CA4BB3-0AE5-4870-8C43-9BB30C80CA47}" type="slidenum">
+            <a:fld id="{25310F6C-E81E-4668-BE2D-9CF4D0F526C8}" type="slidenum">
               <a:rPr b="0" lang="en-US" sz="1200" spc="-1" strike="noStrike">
                 <a:solidFill>
                   <a:srgbClr val="000000"/>
@@ -1069,7 +1069,7 @@
         <p:spPr>
           <a:xfrm>
             <a:off x="380880" y="685800"/>
-            <a:ext cx="6093000" cy="3426120"/>
+            <a:ext cx="6092640" cy="3425760"/>
           </a:xfrm>
           <a:prstGeom prst="rect">
             <a:avLst/>
@@ -1092,7 +1092,7 @@
         <p:spPr>
           <a:xfrm>
             <a:off x="685800" y="4343400"/>
-            <a:ext cx="5483520" cy="4111920"/>
+            <a:ext cx="5483160" cy="4111560"/>
           </a:xfrm>
           <a:prstGeom prst="rect">
             <a:avLst/>
@@ -1126,7 +1126,7 @@
         <p:spPr>
           <a:xfrm>
             <a:off x="3884760" y="8685360"/>
-            <a:ext cx="2968920" cy="454320"/>
+            <a:ext cx="2968560" cy="453960"/>
           </a:xfrm>
           <a:prstGeom prst="rect">
             <a:avLst/>
@@ -1162,7 +1162,7 @@
               </a:lnSpc>
               <a:buNone/>
             </a:pPr>
-            <a:fld id="{81A125B1-53C4-41D6-87A8-53453B2F9424}" type="slidenum">
+            <a:fld id="{C74A5102-8140-4E74-839B-3C3E682224BB}" type="slidenum">
               <a:rPr b="0" lang="en-US" sz="1200" spc="-1" strike="noStrike">
                 <a:solidFill>
                   <a:srgbClr val="000000"/>
@@ -1213,7 +1213,7 @@
         <p:spPr>
           <a:xfrm>
             <a:off x="380880" y="685800"/>
-            <a:ext cx="6093000" cy="3426120"/>
+            <a:ext cx="6092640" cy="3425760"/>
           </a:xfrm>
           <a:prstGeom prst="rect">
             <a:avLst/>
@@ -1236,7 +1236,7 @@
         <p:spPr>
           <a:xfrm>
             <a:off x="685800" y="4343400"/>
-            <a:ext cx="5483520" cy="4111920"/>
+            <a:ext cx="5483160" cy="4111560"/>
           </a:xfrm>
           <a:prstGeom prst="rect">
             <a:avLst/>
@@ -1270,7 +1270,7 @@
         <p:spPr>
           <a:xfrm>
             <a:off x="3884760" y="8685360"/>
-            <a:ext cx="2968920" cy="454320"/>
+            <a:ext cx="2968560" cy="453960"/>
           </a:xfrm>
           <a:prstGeom prst="rect">
             <a:avLst/>
@@ -1306,7 +1306,7 @@
               </a:lnSpc>
               <a:buNone/>
             </a:pPr>
-            <a:fld id="{B0D9B2C7-8736-41F9-9D2F-BCB7E6E53BED}" type="slidenum">
+            <a:fld id="{3CF9D866-6E68-49A0-8431-4729BC40A245}" type="slidenum">
               <a:rPr b="0" lang="en-US" sz="1200" spc="-1" strike="noStrike">
                 <a:solidFill>
                   <a:srgbClr val="000000"/>
@@ -1357,7 +1357,7 @@
         <p:spPr>
           <a:xfrm>
             <a:off x="380880" y="685800"/>
-            <a:ext cx="6093000" cy="3426120"/>
+            <a:ext cx="6092640" cy="3425760"/>
           </a:xfrm>
           <a:prstGeom prst="rect">
             <a:avLst/>
@@ -1380,7 +1380,7 @@
         <p:spPr>
           <a:xfrm>
             <a:off x="685800" y="4343400"/>
-            <a:ext cx="5483520" cy="4111920"/>
+            <a:ext cx="5483160" cy="4111560"/>
           </a:xfrm>
           <a:prstGeom prst="rect">
             <a:avLst/>
@@ -1414,7 +1414,7 @@
         <p:spPr>
           <a:xfrm>
             <a:off x="3884760" y="8685360"/>
-            <a:ext cx="2968920" cy="454320"/>
+            <a:ext cx="2968560" cy="453960"/>
           </a:xfrm>
           <a:prstGeom prst="rect">
             <a:avLst/>
@@ -1450,7 +1450,7 @@
               </a:lnSpc>
               <a:buNone/>
             </a:pPr>
-            <a:fld id="{07ED18BE-DA4A-4594-A85F-3C833C7A9626}" type="slidenum">
+            <a:fld id="{A3F02581-72D3-4796-AEE7-78CD1BE4A8B7}" type="slidenum">
               <a:rPr b="0" lang="en-US" sz="1200" spc="-1" strike="noStrike">
                 <a:solidFill>
                   <a:srgbClr val="000000"/>
@@ -1501,7 +1501,7 @@
         <p:spPr>
           <a:xfrm>
             <a:off x="380880" y="685800"/>
-            <a:ext cx="6093000" cy="3426120"/>
+            <a:ext cx="6092640" cy="3425760"/>
           </a:xfrm>
           <a:prstGeom prst="rect">
             <a:avLst/>
@@ -1524,7 +1524,7 @@
         <p:spPr>
           <a:xfrm>
             <a:off x="685800" y="4343400"/>
-            <a:ext cx="5483520" cy="4111920"/>
+            <a:ext cx="5483160" cy="4111560"/>
           </a:xfrm>
           <a:prstGeom prst="rect">
             <a:avLst/>
@@ -1558,7 +1558,7 @@
         <p:spPr>
           <a:xfrm>
             <a:off x="3884760" y="8685360"/>
-            <a:ext cx="2968920" cy="454320"/>
+            <a:ext cx="2968560" cy="453960"/>
           </a:xfrm>
           <a:prstGeom prst="rect">
             <a:avLst/>
@@ -1594,7 +1594,7 @@
               </a:lnSpc>
               <a:buNone/>
             </a:pPr>
-            <a:fld id="{9CF5197A-985E-4E13-B8A1-C4311EA43A29}" type="slidenum">
+            <a:fld id="{B37A6064-1C7C-4D2C-B8C3-BEBB89BCD4ED}" type="slidenum">
               <a:rPr b="0" lang="en-US" sz="1200" spc="-1" strike="noStrike">
                 <a:solidFill>
                   <a:srgbClr val="000000"/>
@@ -1645,7 +1645,7 @@
         <p:spPr>
           <a:xfrm>
             <a:off x="380880" y="685800"/>
-            <a:ext cx="6093000" cy="3426120"/>
+            <a:ext cx="6092640" cy="3425760"/>
           </a:xfrm>
           <a:prstGeom prst="rect">
             <a:avLst/>
@@ -1668,7 +1668,7 @@
         <p:spPr>
           <a:xfrm>
             <a:off x="685800" y="4343400"/>
-            <a:ext cx="5483520" cy="4111920"/>
+            <a:ext cx="5483160" cy="4111560"/>
           </a:xfrm>
           <a:prstGeom prst="rect">
             <a:avLst/>
@@ -1702,7 +1702,7 @@
         <p:spPr>
           <a:xfrm>
             <a:off x="3884760" y="8685360"/>
-            <a:ext cx="2968920" cy="454320"/>
+            <a:ext cx="2968560" cy="453960"/>
           </a:xfrm>
           <a:prstGeom prst="rect">
             <a:avLst/>
@@ -1738,7 +1738,7 @@
               </a:lnSpc>
               <a:buNone/>
             </a:pPr>
-            <a:fld id="{79F7874A-4412-42D9-A84D-D5297791F784}" type="slidenum">
+            <a:fld id="{3628D73C-4AA6-42C2-B662-509179C2E534}" type="slidenum">
               <a:rPr b="0" lang="en-US" sz="1200" spc="-1" strike="noStrike">
                 <a:solidFill>
                   <a:srgbClr val="000000"/>
@@ -1810,7 +1810,7 @@
         <p:txBody>
           <a:bodyPr/>
           <a:p>
-            <a:fld id="{6A760DAB-70F4-49F4-BFFB-1069C0AEBB5B}" type="slidenum">
+            <a:fld id="{F860713D-2AE3-4036-8F5F-914C9F8A24DE}" type="slidenum">
               <a:t>&lt;#&gt;</a:t>
             </a:fld>
           </a:p>
@@ -1998,7 +1998,7 @@
         <p:txBody>
           <a:bodyPr/>
           <a:p>
-            <a:fld id="{3AAAB7D0-47DD-493A-8049-344D8E9FA23F}" type="slidenum">
+            <a:fld id="{671B82AC-CC63-4C8D-90E1-2B8E1CC83B65}" type="slidenum">
               <a:t>&lt;#&gt;</a:t>
             </a:fld>
           </a:p>
@@ -2254,7 +2254,7 @@
         <p:txBody>
           <a:bodyPr/>
           <a:p>
-            <a:fld id="{AB1B018A-AB00-477C-BC5B-7319D350BC5F}" type="slidenum">
+            <a:fld id="{CE33AAD3-F014-4F37-B45E-49E5A82A9194}" type="slidenum">
               <a:t>&lt;#&gt;</a:t>
             </a:fld>
           </a:p>
@@ -2578,7 +2578,7 @@
         <p:txBody>
           <a:bodyPr/>
           <a:p>
-            <a:fld id="{8F90BA55-A6BD-42D4-91BD-A1C8A7D97235}" type="slidenum">
+            <a:fld id="{FCF23CE9-8DBC-4BE5-934B-D4C77A94CA8E}" type="slidenum">
               <a:t>&lt;#&gt;</a:t>
             </a:fld>
           </a:p>
@@ -2735,7 +2735,7 @@
         <p:txBody>
           <a:bodyPr/>
           <a:p>
-            <a:fld id="{E28D5BFF-E11A-4205-8B80-72E53DC02CAF}" type="slidenum">
+            <a:fld id="{C1269842-FB43-4046-82F2-5319B0E0AF0C}" type="slidenum">
               <a:t>&lt;#&gt;</a:t>
             </a:fld>
           </a:p>
@@ -2889,7 +2889,7 @@
         <p:txBody>
           <a:bodyPr/>
           <a:p>
-            <a:fld id="{998CFE88-94B9-46FD-9A71-C6F876BC1785}" type="slidenum">
+            <a:fld id="{03FBFF0C-88C7-4A34-869A-1E9CE6E27054}" type="slidenum">
               <a:t>&lt;#&gt;</a:t>
             </a:fld>
           </a:p>
@@ -3077,7 +3077,7 @@
         <p:txBody>
           <a:bodyPr/>
           <a:p>
-            <a:fld id="{08808650-EA51-4D8E-AE54-126805C8AFD9}" type="slidenum">
+            <a:fld id="{1829F018-6517-42E8-8951-C055AA5C1B4D}" type="slidenum">
               <a:t>&lt;#&gt;</a:t>
             </a:fld>
           </a:p>
@@ -3197,7 +3197,7 @@
         <p:txBody>
           <a:bodyPr/>
           <a:p>
-            <a:fld id="{AF0737A5-9440-4C3D-9651-2C18566F298B}" type="slidenum">
+            <a:fld id="{DC0CFC63-FFB6-4408-B347-FECFF348CEB2}" type="slidenum">
               <a:t>&lt;#&gt;</a:t>
             </a:fld>
           </a:p>
@@ -3317,7 +3317,7 @@
         <p:txBody>
           <a:bodyPr/>
           <a:p>
-            <a:fld id="{6309E3AD-AB58-462E-B3C2-1E98BA0EB6F1}" type="slidenum">
+            <a:fld id="{F08338AF-56D1-455F-BB9E-87A7EF34627F}" type="slidenum">
               <a:t>&lt;#&gt;</a:t>
             </a:fld>
           </a:p>
@@ -3539,7 +3539,7 @@
         <p:txBody>
           <a:bodyPr/>
           <a:p>
-            <a:fld id="{10EF1FD4-2542-4810-AF39-8E945CBCC2A5}" type="slidenum">
+            <a:fld id="{65D7963C-ED4E-4E3D-8B3A-9C161320E61A}" type="slidenum">
               <a:t>&lt;#&gt;</a:t>
             </a:fld>
           </a:p>
@@ -3761,7 +3761,7 @@
         <p:txBody>
           <a:bodyPr/>
           <a:p>
-            <a:fld id="{475D2AB8-553C-4922-A50E-631E701066CF}" type="slidenum">
+            <a:fld id="{90B6B694-E0A4-4E08-B9F6-5811E1C2FCD8}" type="slidenum">
               <a:t>&lt;#&gt;</a:t>
             </a:fld>
           </a:p>
@@ -3983,7 +3983,7 @@
         <p:txBody>
           <a:bodyPr/>
           <a:p>
-            <a:fld id="{BBC5C6E8-CAD7-4381-A214-F7D70249C6A3}" type="slidenum">
+            <a:fld id="{711C86AD-E3B3-4B4A-9111-5E9D85F8C9A6}" type="slidenum">
               <a:t>&lt;#&gt;</a:t>
             </a:fld>
           </a:p>
@@ -4052,7 +4052,7 @@
         <p:spPr>
           <a:xfrm>
             <a:off x="3028680" y="4771440"/>
-            <a:ext cx="3083760" cy="271800"/>
+            <a:ext cx="3083400" cy="271440"/>
           </a:xfrm>
           <a:prstGeom prst="rect">
             <a:avLst/>
@@ -4117,7 +4117,7 @@
         <p:spPr>
           <a:xfrm>
             <a:off x="6457680" y="4771440"/>
-            <a:ext cx="2055240" cy="271800"/>
+            <a:ext cx="2054880" cy="271440"/>
           </a:xfrm>
           <a:prstGeom prst="rect">
             <a:avLst/>
@@ -4153,7 +4153,7 @@
               </a:lnSpc>
               <a:buNone/>
             </a:pPr>
-            <a:fld id="{A0C3B778-CC56-4212-963F-7DF95266E10D}" type="slidenum">
+            <a:fld id="{B87B6581-806E-4399-95AC-F1089166EA05}" type="slidenum">
               <a:rPr b="0" lang="en-US" sz="1200" spc="-1" strike="noStrike">
                 <a:solidFill>
                   <a:srgbClr val="8b8b8b"/>
@@ -4182,7 +4182,7 @@
         <p:spPr>
           <a:xfrm>
             <a:off x="628200" y="4771440"/>
-            <a:ext cx="2055240" cy="271800"/>
+            <a:ext cx="2054880" cy="271440"/>
           </a:xfrm>
           <a:prstGeom prst="rect">
             <a:avLst/>
@@ -4494,8 +4494,8 @@
         </p:nvSpPr>
         <p:spPr>
           <a:xfrm rot="2744400">
-            <a:off x="-282600" y="-25920"/>
-            <a:ext cx="705960" cy="705600"/>
+            <a:off x="-282240" y="-25920"/>
+            <a:ext cx="705600" cy="705240"/>
           </a:xfrm>
           <a:prstGeom prst="roundRect">
             <a:avLst>
@@ -4532,8 +4532,8 @@
         </p:nvSpPr>
         <p:spPr>
           <a:xfrm rot="2625600">
-            <a:off x="6024960" y="4334040"/>
-            <a:ext cx="469800" cy="469800"/>
+            <a:off x="6024960" y="4333680"/>
+            <a:ext cx="469440" cy="469440"/>
           </a:xfrm>
           <a:prstGeom prst="roundRect">
             <a:avLst>
@@ -4571,7 +4571,7 @@
         <p:spPr>
           <a:xfrm rot="18679200">
             <a:off x="7004880" y="948600"/>
-            <a:ext cx="4941360" cy="4667760"/>
+            <a:ext cx="4941000" cy="4667400"/>
           </a:xfrm>
           <a:prstGeom prst="roundRect">
             <a:avLst>
@@ -4609,7 +4609,7 @@
         <p:spPr>
           <a:xfrm>
             <a:off x="459720" y="4671360"/>
-            <a:ext cx="2997000" cy="267840"/>
+            <a:ext cx="2996640" cy="267480"/>
           </a:xfrm>
           <a:prstGeom prst="rect">
             <a:avLst/>
@@ -4674,8 +4674,8 @@
         </p:blipFill>
         <p:spPr>
           <a:xfrm>
-            <a:off x="2423160" y="4671720"/>
-            <a:ext cx="289440" cy="289440"/>
+            <a:off x="2971800" y="4740120"/>
+            <a:ext cx="289080" cy="289080"/>
           </a:xfrm>
           <a:prstGeom prst="rect">
             <a:avLst/>
@@ -4694,7 +4694,7 @@
         <p:spPr>
           <a:xfrm>
             <a:off x="484920" y="1681560"/>
-            <a:ext cx="5482440" cy="1883880"/>
+            <a:ext cx="5482080" cy="1883520"/>
           </a:xfrm>
           <a:prstGeom prst="rect">
             <a:avLst/>
@@ -4782,8 +4782,8 @@
         </p:nvSpPr>
         <p:spPr>
           <a:xfrm rot="2744400">
-            <a:off x="-282600" y="-25920"/>
-            <a:ext cx="705960" cy="705600"/>
+            <a:off x="-282240" y="-25920"/>
+            <a:ext cx="705600" cy="705240"/>
           </a:xfrm>
           <a:prstGeom prst="roundRect">
             <a:avLst>
@@ -4821,7 +4821,7 @@
         <p:spPr>
           <a:xfrm>
             <a:off x="569160" y="1888920"/>
-            <a:ext cx="4822560" cy="820800"/>
+            <a:ext cx="4822200" cy="820800"/>
           </a:xfrm>
           <a:prstGeom prst="rect">
             <a:avLst/>
@@ -4873,7 +4873,7 @@
         <p:spPr>
           <a:xfrm rot="18679800">
             <a:off x="6783120" y="457560"/>
-            <a:ext cx="6252120" cy="4667760"/>
+            <a:ext cx="6251760" cy="4667400"/>
           </a:xfrm>
           <a:prstGeom prst="roundRect">
             <a:avLst>
@@ -4910,8 +4910,8 @@
         </p:nvSpPr>
         <p:spPr>
           <a:xfrm rot="2625600">
-            <a:off x="6024960" y="4334040"/>
-            <a:ext cx="469800" cy="469800"/>
+            <a:off x="6024960" y="4333680"/>
+            <a:ext cx="469440" cy="469440"/>
           </a:xfrm>
           <a:prstGeom prst="roundRect">
             <a:avLst>
@@ -4949,7 +4949,7 @@
         <p:spPr>
           <a:xfrm>
             <a:off x="1640880" y="4592880"/>
-            <a:ext cx="2997000" cy="267840"/>
+            <a:ext cx="2996640" cy="267480"/>
           </a:xfrm>
           <a:prstGeom prst="rect">
             <a:avLst/>
@@ -5011,7 +5011,7 @@
         <p:spPr>
           <a:xfrm>
             <a:off x="867240" y="3590280"/>
-            <a:ext cx="254880" cy="255240"/>
+            <a:ext cx="254520" cy="254880"/>
           </a:xfrm>
           <a:prstGeom prst="ellipse">
             <a:avLst/>
@@ -5046,7 +5046,7 @@
         <p:spPr>
           <a:xfrm>
             <a:off x="351000" y="3793320"/>
-            <a:ext cx="1287360" cy="1132920"/>
+            <a:ext cx="1287000" cy="1132560"/>
           </a:xfrm>
           <a:prstGeom prst="rect">
             <a:avLst/>
@@ -5095,7 +5095,7 @@
         <p:spPr>
           <a:xfrm>
             <a:off x="586440" y="1246680"/>
-            <a:ext cx="4005720" cy="3601440"/>
+            <a:ext cx="4005360" cy="3601080"/>
           </a:xfrm>
           <a:prstGeom prst="rect">
             <a:avLst/>
@@ -5147,7 +5147,7 @@
         <p:spPr>
           <a:xfrm>
             <a:off x="559800" y="446040"/>
-            <a:ext cx="4285080" cy="685080"/>
+            <a:ext cx="4284720" cy="684720"/>
           </a:xfrm>
           <a:prstGeom prst="rect">
             <a:avLst/>
@@ -5199,7 +5199,7 @@
         <p:spPr>
           <a:xfrm>
             <a:off x="5097600" y="360"/>
-            <a:ext cx="4381200" cy="5145480"/>
+            <a:ext cx="4380840" cy="5145120"/>
           </a:xfrm>
           <a:prstGeom prst="roundRect">
             <a:avLst>
@@ -5264,8 +5264,8 @@
         </p:nvSpPr>
         <p:spPr>
           <a:xfrm rot="2744400">
-            <a:off x="-282600" y="-25920"/>
-            <a:ext cx="705960" cy="705600"/>
+            <a:off x="-282240" y="-25920"/>
+            <a:ext cx="705600" cy="705240"/>
           </a:xfrm>
           <a:prstGeom prst="roundRect">
             <a:avLst>
@@ -5302,8 +5302,8 @@
         </p:nvSpPr>
         <p:spPr>
           <a:xfrm rot="2625600">
-            <a:off x="4861080" y="4147920"/>
-            <a:ext cx="469800" cy="469800"/>
+            <a:off x="4861080" y="4147560"/>
+            <a:ext cx="469440" cy="469440"/>
           </a:xfrm>
           <a:prstGeom prst="roundRect">
             <a:avLst>
@@ -5377,8 +5377,8 @@
         </p:nvSpPr>
         <p:spPr>
           <a:xfrm rot="2744400">
-            <a:off x="-351720" y="4541400"/>
-            <a:ext cx="705960" cy="705600"/>
+            <a:off x="-351360" y="4541040"/>
+            <a:ext cx="705600" cy="705240"/>
           </a:xfrm>
           <a:prstGeom prst="roundRect">
             <a:avLst>
@@ -5415,8 +5415,8 @@
         </p:nvSpPr>
         <p:spPr>
           <a:xfrm rot="19228200">
-            <a:off x="5847480" y="-2268000"/>
-            <a:ext cx="4856760" cy="7727760"/>
+            <a:off x="5847120" y="-2267640"/>
+            <a:ext cx="4856400" cy="7727400"/>
           </a:xfrm>
           <a:prstGeom prst="roundRect">
             <a:avLst>
@@ -5454,9 +5454,9 @@
         <p:grpSpPr>
           <a:xfrm>
             <a:off x="4571640" y="828000"/>
-            <a:ext cx="4469760" cy="3565800"/>
+            <a:ext cx="4469400" cy="3565440"/>
             <a:chOff x="4571640" y="828000"/>
-            <a:chExt cx="4469760" cy="3565800"/>
+            <a:chExt cx="4469400" cy="3565440"/>
           </a:xfrm>
         </p:grpSpPr>
         <p:pic>
@@ -5472,7 +5472,7 @@
           <p:spPr>
             <a:xfrm>
               <a:off x="4571640" y="828000"/>
-              <a:ext cx="4469760" cy="3565800"/>
+              <a:ext cx="4469400" cy="3565440"/>
             </a:xfrm>
             <a:prstGeom prst="rect">
               <a:avLst/>
@@ -5490,8 +5490,8 @@
           </p:nvSpPr>
           <p:spPr>
             <a:xfrm rot="16200000">
-              <a:off x="5962680" y="1157400"/>
-              <a:ext cx="1738800" cy="2772720"/>
+              <a:off x="5962680" y="1157760"/>
+              <a:ext cx="1738440" cy="2772360"/>
             </a:xfrm>
             <a:prstGeom prst="roundRect">
               <a:avLst>
@@ -5558,7 +5558,7 @@
         <p:spPr>
           <a:xfrm>
             <a:off x="586440" y="1246680"/>
-            <a:ext cx="4005720" cy="3601440"/>
+            <a:ext cx="4005360" cy="3601080"/>
           </a:xfrm>
           <a:prstGeom prst="rect">
             <a:avLst/>
@@ -5610,7 +5610,7 @@
         <p:spPr>
           <a:xfrm>
             <a:off x="5446080" y="1672200"/>
-            <a:ext cx="2781720" cy="1738800"/>
+            <a:ext cx="2781360" cy="1738440"/>
           </a:xfrm>
           <a:prstGeom prst="rect">
             <a:avLst/>
@@ -5662,7 +5662,7 @@
         <p:spPr>
           <a:xfrm>
             <a:off x="586440" y="453960"/>
-            <a:ext cx="3698280" cy="856800"/>
+            <a:ext cx="3697920" cy="856440"/>
           </a:xfrm>
           <a:prstGeom prst="rect">
             <a:avLst/>
@@ -5751,7 +5751,7 @@
         <p:spPr>
           <a:xfrm>
             <a:off x="4222080" y="1246680"/>
-            <a:ext cx="4116600" cy="3601440"/>
+            <a:ext cx="4116240" cy="3601080"/>
           </a:xfrm>
           <a:prstGeom prst="rect">
             <a:avLst/>
@@ -5802,8 +5802,8 @@
         </p:nvSpPr>
         <p:spPr>
           <a:xfrm rot="16200000">
-            <a:off x="-2181600" y="1731960"/>
-            <a:ext cx="5145480" cy="1685520"/>
+            <a:off x="-2181600" y="1732320"/>
+            <a:ext cx="5145120" cy="1685160"/>
           </a:xfrm>
           <a:prstGeom prst="roundRect">
             <a:avLst>
@@ -5841,7 +5841,7 @@
         <p:spPr>
           <a:xfrm rot="2745000">
             <a:off x="8575200" y="104760"/>
-            <a:ext cx="1134000" cy="1133640"/>
+            <a:ext cx="1133640" cy="1133280"/>
           </a:xfrm>
           <a:prstGeom prst="roundRect">
             <a:avLst>
@@ -5878,8 +5878,8 @@
         </p:nvSpPr>
         <p:spPr>
           <a:xfrm rot="16200000">
-            <a:off x="614880" y="917280"/>
-            <a:ext cx="3233520" cy="3315240"/>
+            <a:off x="614880" y="917640"/>
+            <a:ext cx="3233160" cy="3314880"/>
           </a:xfrm>
           <a:prstGeom prst="roundRect">
             <a:avLst>
@@ -5945,7 +5945,7 @@
         <p:spPr>
           <a:xfrm>
             <a:off x="4214160" y="456120"/>
-            <a:ext cx="4113360" cy="856800"/>
+            <a:ext cx="4113000" cy="856440"/>
           </a:xfrm>
           <a:prstGeom prst="rect">
             <a:avLst/>
@@ -6033,8 +6033,8 @@
         </p:nvSpPr>
         <p:spPr>
           <a:xfrm rot="2744400">
-            <a:off x="-282600" y="-25920"/>
-            <a:ext cx="705960" cy="705600"/>
+            <a:off x="-282240" y="-25920"/>
+            <a:ext cx="705600" cy="705240"/>
           </a:xfrm>
           <a:prstGeom prst="roundRect">
             <a:avLst>
@@ -6072,7 +6072,7 @@
         <p:spPr>
           <a:xfrm rot="2332200">
             <a:off x="6009480" y="-320040"/>
-            <a:ext cx="4857120" cy="7728120"/>
+            <a:ext cx="4856760" cy="7727760"/>
           </a:xfrm>
           <a:prstGeom prst="roundRect">
             <a:avLst>
@@ -6110,9 +6110,9 @@
         <p:grpSpPr>
           <a:xfrm>
             <a:off x="4571640" y="828000"/>
-            <a:ext cx="4469760" cy="3565800"/>
+            <a:ext cx="4469400" cy="3565440"/>
             <a:chOff x="4571640" y="828000"/>
-            <a:chExt cx="4469760" cy="3565800"/>
+            <a:chExt cx="4469400" cy="3565440"/>
           </a:xfrm>
         </p:grpSpPr>
         <p:pic>
@@ -6128,7 +6128,7 @@
           <p:spPr>
             <a:xfrm>
               <a:off x="4571640" y="828000"/>
-              <a:ext cx="4469760" cy="3565800"/>
+              <a:ext cx="4469400" cy="3565440"/>
             </a:xfrm>
             <a:prstGeom prst="rect">
               <a:avLst/>
@@ -6146,8 +6146,8 @@
           </p:nvSpPr>
           <p:spPr>
             <a:xfrm rot="16200000">
-              <a:off x="5962680" y="1157400"/>
-              <a:ext cx="1738800" cy="2772720"/>
+              <a:off x="5962680" y="1157760"/>
+              <a:ext cx="1738440" cy="2772360"/>
             </a:xfrm>
             <a:prstGeom prst="roundRect">
               <a:avLst>
@@ -6214,7 +6214,7 @@
         <p:spPr>
           <a:xfrm>
             <a:off x="5446080" y="1672200"/>
-            <a:ext cx="2772360" cy="1738800"/>
+            <a:ext cx="2772000" cy="1738440"/>
           </a:xfrm>
           <a:prstGeom prst="rect">
             <a:avLst/>
@@ -6266,7 +6266,7 @@
         <p:spPr>
           <a:xfrm>
             <a:off x="586440" y="1246680"/>
-            <a:ext cx="4005720" cy="3601440"/>
+            <a:ext cx="4005360" cy="3601080"/>
           </a:xfrm>
           <a:prstGeom prst="rect">
             <a:avLst/>
@@ -6318,7 +6318,7 @@
         <p:spPr>
           <a:xfrm>
             <a:off x="586440" y="453960"/>
-            <a:ext cx="4765680" cy="856800"/>
+            <a:ext cx="4765320" cy="856440"/>
           </a:xfrm>
           <a:prstGeom prst="rect">
             <a:avLst/>
@@ -6407,7 +6407,7 @@
         <p:spPr>
           <a:xfrm rot="2745600">
             <a:off x="8349840" y="-668520"/>
-            <a:ext cx="1499760" cy="1499760"/>
+            <a:ext cx="1499400" cy="1499400"/>
           </a:xfrm>
           <a:prstGeom prst="roundRect">
             <a:avLst>
@@ -6445,7 +6445,7 @@
         <p:spPr>
           <a:xfrm rot="2745600">
             <a:off x="7634160" y="-322920"/>
-            <a:ext cx="808560" cy="808920"/>
+            <a:ext cx="808200" cy="808560"/>
           </a:xfrm>
           <a:prstGeom prst="roundRect">
             <a:avLst>
@@ -6484,7 +6484,7 @@
         <p:spPr>
           <a:xfrm>
             <a:off x="586440" y="899640"/>
-            <a:ext cx="7933320" cy="1538640"/>
+            <a:ext cx="7932960" cy="1538280"/>
           </a:xfrm>
           <a:prstGeom prst="rect">
             <a:avLst/>
@@ -6536,7 +6536,7 @@
         <p:spPr>
           <a:xfrm>
             <a:off x="608040" y="2545560"/>
-            <a:ext cx="3713760" cy="2257200"/>
+            <a:ext cx="3713400" cy="2256840"/>
           </a:xfrm>
           <a:prstGeom prst="rect">
             <a:avLst/>
@@ -6588,7 +6588,7 @@
         <p:spPr>
           <a:xfrm>
             <a:off x="4806360" y="2545560"/>
-            <a:ext cx="3713760" cy="2257200"/>
+            <a:ext cx="3713400" cy="2256840"/>
           </a:xfrm>
           <a:prstGeom prst="rect">
             <a:avLst/>
@@ -6640,7 +6640,7 @@
         <p:spPr>
           <a:xfrm>
             <a:off x="583200" y="450720"/>
-            <a:ext cx="7199640" cy="513720"/>
+            <a:ext cx="7199280" cy="513360"/>
           </a:xfrm>
           <a:prstGeom prst="rect">
             <a:avLst/>
@@ -6722,7 +6722,7 @@
         <p:spPr>
           <a:xfrm>
             <a:off x="586440" y="1246680"/>
-            <a:ext cx="4005720" cy="3601440"/>
+            <a:ext cx="4005360" cy="3601080"/>
           </a:xfrm>
           <a:prstGeom prst="rect">
             <a:avLst/>
@@ -6774,7 +6774,7 @@
         <p:spPr>
           <a:xfrm>
             <a:off x="559800" y="446040"/>
-            <a:ext cx="4285080" cy="685080"/>
+            <a:ext cx="4284720" cy="684720"/>
           </a:xfrm>
           <a:prstGeom prst="rect">
             <a:avLst/>
@@ -6826,7 +6826,7 @@
         <p:spPr>
           <a:xfrm>
             <a:off x="5097600" y="360"/>
-            <a:ext cx="4381200" cy="5145480"/>
+            <a:ext cx="4380840" cy="5145120"/>
           </a:xfrm>
           <a:prstGeom prst="roundRect">
             <a:avLst>
@@ -6891,8 +6891,8 @@
         </p:nvSpPr>
         <p:spPr>
           <a:xfrm rot="2744400">
-            <a:off x="-282600" y="-25920"/>
-            <a:ext cx="705960" cy="705600"/>
+            <a:off x="-282240" y="-25920"/>
+            <a:ext cx="705600" cy="705240"/>
           </a:xfrm>
           <a:prstGeom prst="roundRect">
             <a:avLst>
@@ -6929,8 +6929,8 @@
         </p:nvSpPr>
         <p:spPr>
           <a:xfrm rot="2625600">
-            <a:off x="4861080" y="4147920"/>
-            <a:ext cx="469800" cy="469800"/>
+            <a:off x="4861080" y="4147560"/>
+            <a:ext cx="469440" cy="469440"/>
           </a:xfrm>
           <a:prstGeom prst="roundRect">
             <a:avLst>
@@ -7004,8 +7004,8 @@
         </p:nvSpPr>
         <p:spPr>
           <a:xfrm rot="2744400">
-            <a:off x="-351720" y="4541400"/>
-            <a:ext cx="705960" cy="705600"/>
+            <a:off x="-351360" y="4541040"/>
+            <a:ext cx="705600" cy="705240"/>
           </a:xfrm>
           <a:prstGeom prst="roundRect">
             <a:avLst>
@@ -7042,8 +7042,8 @@
         </p:nvSpPr>
         <p:spPr>
           <a:xfrm rot="19228200">
-            <a:off x="5847480" y="-2268000"/>
-            <a:ext cx="4856760" cy="7727760"/>
+            <a:off x="5847120" y="-2267640"/>
+            <a:ext cx="4856400" cy="7727400"/>
           </a:xfrm>
           <a:prstGeom prst="roundRect">
             <a:avLst>
@@ -7081,9 +7081,9 @@
         <p:grpSpPr>
           <a:xfrm>
             <a:off x="4571640" y="828000"/>
-            <a:ext cx="4469760" cy="3565800"/>
+            <a:ext cx="4469400" cy="3565440"/>
             <a:chOff x="4571640" y="828000"/>
-            <a:chExt cx="4469760" cy="3565800"/>
+            <a:chExt cx="4469400" cy="3565440"/>
           </a:xfrm>
         </p:grpSpPr>
         <p:pic>
@@ -7099,7 +7099,7 @@
           <p:spPr>
             <a:xfrm>
               <a:off x="4571640" y="828000"/>
-              <a:ext cx="4469760" cy="3565800"/>
+              <a:ext cx="4469400" cy="3565440"/>
             </a:xfrm>
             <a:prstGeom prst="rect">
               <a:avLst/>
@@ -7117,8 +7117,8 @@
           </p:nvSpPr>
           <p:spPr>
             <a:xfrm rot="16200000">
-              <a:off x="5962680" y="1157400"/>
-              <a:ext cx="1738800" cy="2772720"/>
+              <a:off x="5962680" y="1157760"/>
+              <a:ext cx="1738440" cy="2772360"/>
             </a:xfrm>
             <a:prstGeom prst="roundRect">
               <a:avLst>
@@ -7185,7 +7185,7 @@
         <p:spPr>
           <a:xfrm>
             <a:off x="586440" y="1246680"/>
-            <a:ext cx="4005720" cy="3601440"/>
+            <a:ext cx="4005360" cy="3601080"/>
           </a:xfrm>
           <a:prstGeom prst="rect">
             <a:avLst/>
@@ -7237,7 +7237,7 @@
         <p:spPr>
           <a:xfrm>
             <a:off x="5446080" y="1672200"/>
-            <a:ext cx="2781720" cy="1738800"/>
+            <a:ext cx="2781360" cy="1738440"/>
           </a:xfrm>
           <a:prstGeom prst="rect">
             <a:avLst/>
@@ -7289,7 +7289,7 @@
         <p:spPr>
           <a:xfrm>
             <a:off x="586440" y="453960"/>
-            <a:ext cx="3698280" cy="856800"/>
+            <a:ext cx="3697920" cy="856440"/>
           </a:xfrm>
           <a:prstGeom prst="rect">
             <a:avLst/>
@@ -7378,7 +7378,7 @@
         <p:spPr>
           <a:xfrm>
             <a:off x="4222080" y="1246680"/>
-            <a:ext cx="4116600" cy="3601440"/>
+            <a:ext cx="4116240" cy="3601080"/>
           </a:xfrm>
           <a:prstGeom prst="rect">
             <a:avLst/>
@@ -7429,8 +7429,8 @@
         </p:nvSpPr>
         <p:spPr>
           <a:xfrm rot="16200000">
-            <a:off x="-2181600" y="1731960"/>
-            <a:ext cx="5145480" cy="1685520"/>
+            <a:off x="-2181600" y="1732320"/>
+            <a:ext cx="5145120" cy="1685160"/>
           </a:xfrm>
           <a:prstGeom prst="roundRect">
             <a:avLst>
@@ -7468,7 +7468,7 @@
         <p:spPr>
           <a:xfrm rot="2745000">
             <a:off x="8575200" y="104760"/>
-            <a:ext cx="1134000" cy="1133640"/>
+            <a:ext cx="1133640" cy="1133280"/>
           </a:xfrm>
           <a:prstGeom prst="roundRect">
             <a:avLst>
@@ -7505,8 +7505,8 @@
         </p:nvSpPr>
         <p:spPr>
           <a:xfrm rot="16200000">
-            <a:off x="614880" y="917280"/>
-            <a:ext cx="3233520" cy="3315240"/>
+            <a:off x="614880" y="917640"/>
+            <a:ext cx="3233160" cy="3314880"/>
           </a:xfrm>
           <a:prstGeom prst="roundRect">
             <a:avLst>
@@ -7572,7 +7572,7 @@
         <p:spPr>
           <a:xfrm>
             <a:off x="4214160" y="456120"/>
-            <a:ext cx="4113360" cy="856800"/>
+            <a:ext cx="4113000" cy="856440"/>
           </a:xfrm>
           <a:prstGeom prst="rect">
             <a:avLst/>

</xml_diff>